<commit_message>
Updated slides, finished report
</commit_message>
<xml_diff>
--- a/FinalPresentation.pptx
+++ b/FinalPresentation.pptx
@@ -6,6 +6,17 @@
   </p:sldMasterIdLst>
   <p:sldIdLst>
     <p:sldId id="256" r:id="rId2"/>
+    <p:sldId id="258" r:id="rId3"/>
+    <p:sldId id="259" r:id="rId4"/>
+    <p:sldId id="257" r:id="rId5"/>
+    <p:sldId id="260" r:id="rId6"/>
+    <p:sldId id="261" r:id="rId7"/>
+    <p:sldId id="262" r:id="rId8"/>
+    <p:sldId id="263" r:id="rId9"/>
+    <p:sldId id="264" r:id="rId10"/>
+    <p:sldId id="267" r:id="rId11"/>
+    <p:sldId id="265" r:id="rId12"/>
+    <p:sldId id="266" r:id="rId13"/>
   </p:sldIdLst>
   <p:sldSz cx="9144000" cy="6858000" type="screen4x3"/>
   <p:notesSz cx="6858000" cy="9144000"/>
@@ -254,7 +265,7 @@
           <a:p>
             <a:fld id="{6270B643-D407-470F-8B85-01D08C506417}" type="datetimeFigureOut">
               <a:rPr lang="en-US" smtClean="0"/>
-              <a:t>7/22/2022</a:t>
+              <a:t>7/24/2022</a:t>
             </a:fld>
             <a:endParaRPr lang="en-US"/>
           </a:p>
@@ -424,7 +435,7 @@
           <a:p>
             <a:fld id="{6270B643-D407-470F-8B85-01D08C506417}" type="datetimeFigureOut">
               <a:rPr lang="en-US" smtClean="0"/>
-              <a:t>7/22/2022</a:t>
+              <a:t>7/24/2022</a:t>
             </a:fld>
             <a:endParaRPr lang="en-US"/>
           </a:p>
@@ -604,7 +615,7 @@
           <a:p>
             <a:fld id="{6270B643-D407-470F-8B85-01D08C506417}" type="datetimeFigureOut">
               <a:rPr lang="en-US" smtClean="0"/>
-              <a:t>7/22/2022</a:t>
+              <a:t>7/24/2022</a:t>
             </a:fld>
             <a:endParaRPr lang="en-US"/>
           </a:p>
@@ -774,7 +785,7 @@
           <a:p>
             <a:fld id="{6270B643-D407-470F-8B85-01D08C506417}" type="datetimeFigureOut">
               <a:rPr lang="en-US" smtClean="0"/>
-              <a:t>7/22/2022</a:t>
+              <a:t>7/24/2022</a:t>
             </a:fld>
             <a:endParaRPr lang="en-US"/>
           </a:p>
@@ -1018,7 +1029,7 @@
           <a:p>
             <a:fld id="{6270B643-D407-470F-8B85-01D08C506417}" type="datetimeFigureOut">
               <a:rPr lang="en-US" smtClean="0"/>
-              <a:t>7/22/2022</a:t>
+              <a:t>7/24/2022</a:t>
             </a:fld>
             <a:endParaRPr lang="en-US"/>
           </a:p>
@@ -1250,7 +1261,7 @@
           <a:p>
             <a:fld id="{6270B643-D407-470F-8B85-01D08C506417}" type="datetimeFigureOut">
               <a:rPr lang="en-US" smtClean="0"/>
-              <a:t>7/22/2022</a:t>
+              <a:t>7/24/2022</a:t>
             </a:fld>
             <a:endParaRPr lang="en-US"/>
           </a:p>
@@ -1617,7 +1628,7 @@
           <a:p>
             <a:fld id="{6270B643-D407-470F-8B85-01D08C506417}" type="datetimeFigureOut">
               <a:rPr lang="en-US" smtClean="0"/>
-              <a:t>7/22/2022</a:t>
+              <a:t>7/24/2022</a:t>
             </a:fld>
             <a:endParaRPr lang="en-US"/>
           </a:p>
@@ -1735,7 +1746,7 @@
           <a:p>
             <a:fld id="{6270B643-D407-470F-8B85-01D08C506417}" type="datetimeFigureOut">
               <a:rPr lang="en-US" smtClean="0"/>
-              <a:t>7/22/2022</a:t>
+              <a:t>7/24/2022</a:t>
             </a:fld>
             <a:endParaRPr lang="en-US"/>
           </a:p>
@@ -1830,7 +1841,7 @@
           <a:p>
             <a:fld id="{6270B643-D407-470F-8B85-01D08C506417}" type="datetimeFigureOut">
               <a:rPr lang="en-US" smtClean="0"/>
-              <a:t>7/22/2022</a:t>
+              <a:t>7/24/2022</a:t>
             </a:fld>
             <a:endParaRPr lang="en-US"/>
           </a:p>
@@ -2107,7 +2118,7 @@
           <a:p>
             <a:fld id="{6270B643-D407-470F-8B85-01D08C506417}" type="datetimeFigureOut">
               <a:rPr lang="en-US" smtClean="0"/>
-              <a:t>7/22/2022</a:t>
+              <a:t>7/24/2022</a:t>
             </a:fld>
             <a:endParaRPr lang="en-US"/>
           </a:p>
@@ -2364,7 +2375,7 @@
           <a:p>
             <a:fld id="{6270B643-D407-470F-8B85-01D08C506417}" type="datetimeFigureOut">
               <a:rPr lang="en-US" smtClean="0"/>
-              <a:t>7/22/2022</a:t>
+              <a:t>7/24/2022</a:t>
             </a:fld>
             <a:endParaRPr lang="en-US"/>
           </a:p>
@@ -2577,7 +2588,7 @@
           <a:p>
             <a:fld id="{6270B643-D407-470F-8B85-01D08C506417}" type="datetimeFigureOut">
               <a:rPr lang="en-US" smtClean="0"/>
-              <a:t>7/22/2022</a:t>
+              <a:t>7/24/2022</a:t>
             </a:fld>
             <a:endParaRPr lang="en-US"/>
           </a:p>
@@ -2998,37 +3009,20 @@
             <p:ph type="ctrTitle"/>
           </p:nvPr>
         </p:nvSpPr>
-        <p:spPr/>
-        <p:txBody>
-          <a:bodyPr/>
-          <a:lstStyle/>
-          <a:p>
-            <a:endParaRPr lang="en-US"/>
-          </a:p>
-        </p:txBody>
-      </p:sp>
-      <p:sp>
-        <p:nvSpPr>
-          <p:cNvPr id="3" name="Subtitle 2">
-            <a:extLst>
-              <a:ext uri="{FF2B5EF4-FFF2-40B4-BE49-F238E27FC236}">
-                <a16:creationId xmlns:a16="http://schemas.microsoft.com/office/drawing/2014/main" id="{C91DD4C4-BB94-5F98-9102-D3EB30B4EE59}"/>
-              </a:ext>
-            </a:extLst>
-          </p:cNvPr>
-          <p:cNvSpPr>
-            <a:spLocks noGrp="1"/>
-          </p:cNvSpPr>
-          <p:nvPr>
-            <p:ph type="subTitle" idx="1"/>
-          </p:nvPr>
-        </p:nvSpPr>
-        <p:spPr/>
-        <p:txBody>
-          <a:bodyPr/>
-          <a:lstStyle/>
-          <a:p>
-            <a:endParaRPr lang="en-US"/>
+        <p:spPr>
+          <a:xfrm>
+            <a:off x="685800" y="1199055"/>
+            <a:ext cx="7772400" cy="2387600"/>
+          </a:xfrm>
+        </p:spPr>
+        <p:txBody>
+          <a:bodyPr/>
+          <a:lstStyle/>
+          <a:p>
+            <a:r>
+              <a:rPr lang="en-US" dirty="0"/>
+              <a:t>Sentiment Analysis of Reddit Data</a:t>
+            </a:r>
           </a:p>
         </p:txBody>
       </p:sp>
@@ -3036,6 +3030,986 @@
     <p:extLst>
       <p:ext uri="{BB962C8B-B14F-4D97-AF65-F5344CB8AC3E}">
         <p14:creationId xmlns:p14="http://schemas.microsoft.com/office/powerpoint/2010/main" val="3629929762"/>
+      </p:ext>
+    </p:extLst>
+  </p:cSld>
+  <p:clrMapOvr>
+    <a:masterClrMapping/>
+  </p:clrMapOvr>
+</p:sld>
+</file>
+
+<file path=ppt/slides/slide10.xml><?xml version="1.0" encoding="utf-8"?>
+<p:sld xmlns:a="http://schemas.openxmlformats.org/drawingml/2006/main" xmlns:r="http://schemas.openxmlformats.org/officeDocument/2006/relationships" xmlns:p="http://schemas.openxmlformats.org/presentationml/2006/main">
+  <p:cSld>
+    <p:spTree>
+      <p:nvGrpSpPr>
+        <p:cNvPr id="1" name=""/>
+        <p:cNvGrpSpPr/>
+        <p:nvPr/>
+      </p:nvGrpSpPr>
+      <p:grpSpPr>
+        <a:xfrm>
+          <a:off x="0" y="0"/>
+          <a:ext cx="0" cy="0"/>
+          <a:chOff x="0" y="0"/>
+          <a:chExt cx="0" cy="0"/>
+        </a:xfrm>
+      </p:grpSpPr>
+      <p:sp>
+        <p:nvSpPr>
+          <p:cNvPr id="2" name="Title 1">
+            <a:extLst>
+              <a:ext uri="{FF2B5EF4-FFF2-40B4-BE49-F238E27FC236}">
+                <a16:creationId xmlns:a16="http://schemas.microsoft.com/office/drawing/2014/main" id="{7F1C6135-BC25-5C68-8500-30FFA71D08DF}"/>
+              </a:ext>
+            </a:extLst>
+          </p:cNvPr>
+          <p:cNvSpPr>
+            <a:spLocks noGrp="1"/>
+          </p:cNvSpPr>
+          <p:nvPr>
+            <p:ph type="title"/>
+          </p:nvPr>
+        </p:nvSpPr>
+        <p:spPr/>
+        <p:txBody>
+          <a:bodyPr/>
+          <a:lstStyle/>
+          <a:p>
+            <a:r>
+              <a:rPr lang="en-US" dirty="0"/>
+              <a:t>Statistical Analysis</a:t>
+            </a:r>
+          </a:p>
+        </p:txBody>
+      </p:sp>
+      <p:sp>
+        <p:nvSpPr>
+          <p:cNvPr id="3" name="Content Placeholder 2">
+            <a:extLst>
+              <a:ext uri="{FF2B5EF4-FFF2-40B4-BE49-F238E27FC236}">
+                <a16:creationId xmlns:a16="http://schemas.microsoft.com/office/drawing/2014/main" id="{E09C170F-1516-57B6-D5E9-D60DFB947018}"/>
+              </a:ext>
+            </a:extLst>
+          </p:cNvPr>
+          <p:cNvSpPr>
+            <a:spLocks noGrp="1"/>
+          </p:cNvSpPr>
+          <p:nvPr>
+            <p:ph idx="1"/>
+          </p:nvPr>
+        </p:nvSpPr>
+        <p:spPr/>
+        <p:txBody>
+          <a:bodyPr/>
+          <a:lstStyle/>
+          <a:p>
+            <a:endParaRPr lang="en-US"/>
+          </a:p>
+        </p:txBody>
+      </p:sp>
+    </p:spTree>
+    <p:extLst>
+      <p:ext uri="{BB962C8B-B14F-4D97-AF65-F5344CB8AC3E}">
+        <p14:creationId xmlns:p14="http://schemas.microsoft.com/office/powerpoint/2010/main" val="1730515028"/>
+      </p:ext>
+    </p:extLst>
+  </p:cSld>
+  <p:clrMapOvr>
+    <a:masterClrMapping/>
+  </p:clrMapOvr>
+</p:sld>
+</file>
+
+<file path=ppt/slides/slide11.xml><?xml version="1.0" encoding="utf-8"?>
+<p:sld xmlns:a="http://schemas.openxmlformats.org/drawingml/2006/main" xmlns:r="http://schemas.openxmlformats.org/officeDocument/2006/relationships" xmlns:p="http://schemas.openxmlformats.org/presentationml/2006/main">
+  <p:cSld>
+    <p:spTree>
+      <p:nvGrpSpPr>
+        <p:cNvPr id="1" name=""/>
+        <p:cNvGrpSpPr/>
+        <p:nvPr/>
+      </p:nvGrpSpPr>
+      <p:grpSpPr>
+        <a:xfrm>
+          <a:off x="0" y="0"/>
+          <a:ext cx="0" cy="0"/>
+          <a:chOff x="0" y="0"/>
+          <a:chExt cx="0" cy="0"/>
+        </a:xfrm>
+      </p:grpSpPr>
+      <p:sp>
+        <p:nvSpPr>
+          <p:cNvPr id="2" name="Title 1">
+            <a:extLst>
+              <a:ext uri="{FF2B5EF4-FFF2-40B4-BE49-F238E27FC236}">
+                <a16:creationId xmlns:a16="http://schemas.microsoft.com/office/drawing/2014/main" id="{75CA626E-2B62-0020-5246-A67AD611B4B5}"/>
+              </a:ext>
+            </a:extLst>
+          </p:cNvPr>
+          <p:cNvSpPr>
+            <a:spLocks noGrp="1"/>
+          </p:cNvSpPr>
+          <p:nvPr>
+            <p:ph type="title"/>
+          </p:nvPr>
+        </p:nvSpPr>
+        <p:spPr/>
+        <p:txBody>
+          <a:bodyPr/>
+          <a:lstStyle/>
+          <a:p>
+            <a:r>
+              <a:rPr lang="en-US" dirty="0"/>
+              <a:t>Conclusion</a:t>
+            </a:r>
+          </a:p>
+        </p:txBody>
+      </p:sp>
+      <p:sp>
+        <p:nvSpPr>
+          <p:cNvPr id="3" name="Content Placeholder 2">
+            <a:extLst>
+              <a:ext uri="{FF2B5EF4-FFF2-40B4-BE49-F238E27FC236}">
+                <a16:creationId xmlns:a16="http://schemas.microsoft.com/office/drawing/2014/main" id="{E6A740DC-EAAE-E303-BA60-6C0514078F13}"/>
+              </a:ext>
+            </a:extLst>
+          </p:cNvPr>
+          <p:cNvSpPr>
+            <a:spLocks noGrp="1"/>
+          </p:cNvSpPr>
+          <p:nvPr>
+            <p:ph idx="1"/>
+          </p:nvPr>
+        </p:nvSpPr>
+        <p:spPr/>
+        <p:txBody>
+          <a:bodyPr/>
+          <a:lstStyle/>
+          <a:p>
+            <a:endParaRPr lang="en-US"/>
+          </a:p>
+        </p:txBody>
+      </p:sp>
+    </p:spTree>
+    <p:extLst>
+      <p:ext uri="{BB962C8B-B14F-4D97-AF65-F5344CB8AC3E}">
+        <p14:creationId xmlns:p14="http://schemas.microsoft.com/office/powerpoint/2010/main" val="2996756302"/>
+      </p:ext>
+    </p:extLst>
+  </p:cSld>
+  <p:clrMapOvr>
+    <a:masterClrMapping/>
+  </p:clrMapOvr>
+</p:sld>
+</file>
+
+<file path=ppt/slides/slide12.xml><?xml version="1.0" encoding="utf-8"?>
+<p:sld xmlns:a="http://schemas.openxmlformats.org/drawingml/2006/main" xmlns:r="http://schemas.openxmlformats.org/officeDocument/2006/relationships" xmlns:p="http://schemas.openxmlformats.org/presentationml/2006/main">
+  <p:cSld>
+    <p:spTree>
+      <p:nvGrpSpPr>
+        <p:cNvPr id="1" name=""/>
+        <p:cNvGrpSpPr/>
+        <p:nvPr/>
+      </p:nvGrpSpPr>
+      <p:grpSpPr>
+        <a:xfrm>
+          <a:off x="0" y="0"/>
+          <a:ext cx="0" cy="0"/>
+          <a:chOff x="0" y="0"/>
+          <a:chExt cx="0" cy="0"/>
+        </a:xfrm>
+      </p:grpSpPr>
+      <p:sp>
+        <p:nvSpPr>
+          <p:cNvPr id="2" name="Title 1">
+            <a:extLst>
+              <a:ext uri="{FF2B5EF4-FFF2-40B4-BE49-F238E27FC236}">
+                <a16:creationId xmlns:a16="http://schemas.microsoft.com/office/drawing/2014/main" id="{F4DBCB3D-9854-8155-287A-9B2D6CD8D73E}"/>
+              </a:ext>
+            </a:extLst>
+          </p:cNvPr>
+          <p:cNvSpPr>
+            <a:spLocks noGrp="1"/>
+          </p:cNvSpPr>
+          <p:nvPr>
+            <p:ph type="title"/>
+          </p:nvPr>
+        </p:nvSpPr>
+        <p:spPr/>
+        <p:txBody>
+          <a:bodyPr/>
+          <a:lstStyle/>
+          <a:p>
+            <a:r>
+              <a:rPr lang="en-US" dirty="0"/>
+              <a:t>Questions?</a:t>
+            </a:r>
+          </a:p>
+        </p:txBody>
+      </p:sp>
+      <p:sp>
+        <p:nvSpPr>
+          <p:cNvPr id="3" name="Content Placeholder 2">
+            <a:extLst>
+              <a:ext uri="{FF2B5EF4-FFF2-40B4-BE49-F238E27FC236}">
+                <a16:creationId xmlns:a16="http://schemas.microsoft.com/office/drawing/2014/main" id="{96F27CE1-DAA3-433B-FFDC-63E5A6A34393}"/>
+              </a:ext>
+            </a:extLst>
+          </p:cNvPr>
+          <p:cNvSpPr>
+            <a:spLocks noGrp="1"/>
+          </p:cNvSpPr>
+          <p:nvPr>
+            <p:ph idx="1"/>
+          </p:nvPr>
+        </p:nvSpPr>
+        <p:spPr/>
+        <p:txBody>
+          <a:bodyPr/>
+          <a:lstStyle/>
+          <a:p>
+            <a:endParaRPr lang="en-US"/>
+          </a:p>
+        </p:txBody>
+      </p:sp>
+    </p:spTree>
+    <p:extLst>
+      <p:ext uri="{BB962C8B-B14F-4D97-AF65-F5344CB8AC3E}">
+        <p14:creationId xmlns:p14="http://schemas.microsoft.com/office/powerpoint/2010/main" val="3489037010"/>
+      </p:ext>
+    </p:extLst>
+  </p:cSld>
+  <p:clrMapOvr>
+    <a:masterClrMapping/>
+  </p:clrMapOvr>
+</p:sld>
+</file>
+
+<file path=ppt/slides/slide2.xml><?xml version="1.0" encoding="utf-8"?>
+<p:sld xmlns:a="http://schemas.openxmlformats.org/drawingml/2006/main" xmlns:r="http://schemas.openxmlformats.org/officeDocument/2006/relationships" xmlns:p="http://schemas.openxmlformats.org/presentationml/2006/main">
+  <p:cSld>
+    <p:spTree>
+      <p:nvGrpSpPr>
+        <p:cNvPr id="1" name=""/>
+        <p:cNvGrpSpPr/>
+        <p:nvPr/>
+      </p:nvGrpSpPr>
+      <p:grpSpPr>
+        <a:xfrm>
+          <a:off x="0" y="0"/>
+          <a:ext cx="0" cy="0"/>
+          <a:chOff x="0" y="0"/>
+          <a:chExt cx="0" cy="0"/>
+        </a:xfrm>
+      </p:grpSpPr>
+      <p:sp>
+        <p:nvSpPr>
+          <p:cNvPr id="2" name="Title 1">
+            <a:extLst>
+              <a:ext uri="{FF2B5EF4-FFF2-40B4-BE49-F238E27FC236}">
+                <a16:creationId xmlns:a16="http://schemas.microsoft.com/office/drawing/2014/main" id="{5EB37C9E-8E71-63F4-C151-63ECC4061DAB}"/>
+              </a:ext>
+            </a:extLst>
+          </p:cNvPr>
+          <p:cNvSpPr>
+            <a:spLocks noGrp="1"/>
+          </p:cNvSpPr>
+          <p:nvPr>
+            <p:ph type="title"/>
+          </p:nvPr>
+        </p:nvSpPr>
+        <p:spPr/>
+        <p:txBody>
+          <a:bodyPr/>
+          <a:lstStyle/>
+          <a:p>
+            <a:r>
+              <a:rPr lang="en-US" dirty="0"/>
+              <a:t>Research Question</a:t>
+            </a:r>
+          </a:p>
+        </p:txBody>
+      </p:sp>
+      <p:sp>
+        <p:nvSpPr>
+          <p:cNvPr id="3" name="Content Placeholder 2">
+            <a:extLst>
+              <a:ext uri="{FF2B5EF4-FFF2-40B4-BE49-F238E27FC236}">
+                <a16:creationId xmlns:a16="http://schemas.microsoft.com/office/drawing/2014/main" id="{5E768D12-88D2-376E-8663-5C0E1C7B21F7}"/>
+              </a:ext>
+            </a:extLst>
+          </p:cNvPr>
+          <p:cNvSpPr>
+            <a:spLocks noGrp="1"/>
+          </p:cNvSpPr>
+          <p:nvPr>
+            <p:ph idx="1"/>
+          </p:nvPr>
+        </p:nvSpPr>
+        <p:spPr/>
+        <p:txBody>
+          <a:bodyPr/>
+          <a:lstStyle/>
+          <a:p>
+            <a:endParaRPr lang="en-US" dirty="0"/>
+          </a:p>
+        </p:txBody>
+      </p:sp>
+    </p:spTree>
+    <p:extLst>
+      <p:ext uri="{BB962C8B-B14F-4D97-AF65-F5344CB8AC3E}">
+        <p14:creationId xmlns:p14="http://schemas.microsoft.com/office/powerpoint/2010/main" val="1750131832"/>
+      </p:ext>
+    </p:extLst>
+  </p:cSld>
+  <p:clrMapOvr>
+    <a:masterClrMapping/>
+  </p:clrMapOvr>
+</p:sld>
+</file>
+
+<file path=ppt/slides/slide3.xml><?xml version="1.0" encoding="utf-8"?>
+<p:sld xmlns:a="http://schemas.openxmlformats.org/drawingml/2006/main" xmlns:r="http://schemas.openxmlformats.org/officeDocument/2006/relationships" xmlns:p="http://schemas.openxmlformats.org/presentationml/2006/main">
+  <p:cSld>
+    <p:spTree>
+      <p:nvGrpSpPr>
+        <p:cNvPr id="1" name=""/>
+        <p:cNvGrpSpPr/>
+        <p:nvPr/>
+      </p:nvGrpSpPr>
+      <p:grpSpPr>
+        <a:xfrm>
+          <a:off x="0" y="0"/>
+          <a:ext cx="0" cy="0"/>
+          <a:chOff x="0" y="0"/>
+          <a:chExt cx="0" cy="0"/>
+        </a:xfrm>
+      </p:grpSpPr>
+      <p:sp>
+        <p:nvSpPr>
+          <p:cNvPr id="2" name="Title 1">
+            <a:extLst>
+              <a:ext uri="{FF2B5EF4-FFF2-40B4-BE49-F238E27FC236}">
+                <a16:creationId xmlns:a16="http://schemas.microsoft.com/office/drawing/2014/main" id="{645BED52-A5A4-170E-9025-82C62DA03EE0}"/>
+              </a:ext>
+            </a:extLst>
+          </p:cNvPr>
+          <p:cNvSpPr>
+            <a:spLocks noGrp="1"/>
+          </p:cNvSpPr>
+          <p:nvPr>
+            <p:ph type="title"/>
+          </p:nvPr>
+        </p:nvSpPr>
+        <p:spPr/>
+        <p:txBody>
+          <a:bodyPr/>
+          <a:lstStyle/>
+          <a:p>
+            <a:r>
+              <a:rPr lang="en-US" dirty="0"/>
+              <a:t>Sentiment Analysis</a:t>
+            </a:r>
+          </a:p>
+        </p:txBody>
+      </p:sp>
+      <p:sp>
+        <p:nvSpPr>
+          <p:cNvPr id="3" name="Content Placeholder 2">
+            <a:extLst>
+              <a:ext uri="{FF2B5EF4-FFF2-40B4-BE49-F238E27FC236}">
+                <a16:creationId xmlns:a16="http://schemas.microsoft.com/office/drawing/2014/main" id="{5B45C32F-7D87-41B8-A945-5ECDB956DBD1}"/>
+              </a:ext>
+            </a:extLst>
+          </p:cNvPr>
+          <p:cNvSpPr>
+            <a:spLocks noGrp="1"/>
+          </p:cNvSpPr>
+          <p:nvPr>
+            <p:ph idx="1"/>
+          </p:nvPr>
+        </p:nvSpPr>
+        <p:spPr/>
+        <p:txBody>
+          <a:bodyPr/>
+          <a:lstStyle/>
+          <a:p>
+            <a:endParaRPr lang="en-US"/>
+          </a:p>
+        </p:txBody>
+      </p:sp>
+    </p:spTree>
+    <p:extLst>
+      <p:ext uri="{BB962C8B-B14F-4D97-AF65-F5344CB8AC3E}">
+        <p14:creationId xmlns:p14="http://schemas.microsoft.com/office/powerpoint/2010/main" val="1224928503"/>
+      </p:ext>
+    </p:extLst>
+  </p:cSld>
+  <p:clrMapOvr>
+    <a:masterClrMapping/>
+  </p:clrMapOvr>
+</p:sld>
+</file>
+
+<file path=ppt/slides/slide4.xml><?xml version="1.0" encoding="utf-8"?>
+<p:sld xmlns:a="http://schemas.openxmlformats.org/drawingml/2006/main" xmlns:r="http://schemas.openxmlformats.org/officeDocument/2006/relationships" xmlns:p="http://schemas.openxmlformats.org/presentationml/2006/main">
+  <p:cSld>
+    <p:spTree>
+      <p:nvGrpSpPr>
+        <p:cNvPr id="1" name=""/>
+        <p:cNvGrpSpPr/>
+        <p:nvPr/>
+      </p:nvGrpSpPr>
+      <p:grpSpPr>
+        <a:xfrm>
+          <a:off x="0" y="0"/>
+          <a:ext cx="0" cy="0"/>
+          <a:chOff x="0" y="0"/>
+          <a:chExt cx="0" cy="0"/>
+        </a:xfrm>
+      </p:grpSpPr>
+      <p:sp>
+        <p:nvSpPr>
+          <p:cNvPr id="2" name="Title 1">
+            <a:extLst>
+              <a:ext uri="{FF2B5EF4-FFF2-40B4-BE49-F238E27FC236}">
+                <a16:creationId xmlns:a16="http://schemas.microsoft.com/office/drawing/2014/main" id="{76C1949B-6F59-91F8-63BE-3E08FDD54DB7}"/>
+              </a:ext>
+            </a:extLst>
+          </p:cNvPr>
+          <p:cNvSpPr>
+            <a:spLocks noGrp="1"/>
+          </p:cNvSpPr>
+          <p:nvPr>
+            <p:ph type="title"/>
+          </p:nvPr>
+        </p:nvSpPr>
+        <p:spPr/>
+        <p:txBody>
+          <a:bodyPr/>
+          <a:lstStyle/>
+          <a:p>
+            <a:r>
+              <a:rPr lang="en-US" dirty="0"/>
+              <a:t>Dataset</a:t>
+            </a:r>
+          </a:p>
+        </p:txBody>
+      </p:sp>
+      <p:sp>
+        <p:nvSpPr>
+          <p:cNvPr id="3" name="Content Placeholder 2">
+            <a:extLst>
+              <a:ext uri="{FF2B5EF4-FFF2-40B4-BE49-F238E27FC236}">
+                <a16:creationId xmlns:a16="http://schemas.microsoft.com/office/drawing/2014/main" id="{44307EEA-F6A2-8E50-5FF8-06ABE09E887C}"/>
+              </a:ext>
+            </a:extLst>
+          </p:cNvPr>
+          <p:cNvSpPr>
+            <a:spLocks noGrp="1"/>
+          </p:cNvSpPr>
+          <p:nvPr>
+            <p:ph idx="1"/>
+          </p:nvPr>
+        </p:nvSpPr>
+        <p:spPr/>
+        <p:txBody>
+          <a:bodyPr/>
+          <a:lstStyle/>
+          <a:p>
+            <a:endParaRPr lang="en-US"/>
+          </a:p>
+        </p:txBody>
+      </p:sp>
+    </p:spTree>
+    <p:extLst>
+      <p:ext uri="{BB962C8B-B14F-4D97-AF65-F5344CB8AC3E}">
+        <p14:creationId xmlns:p14="http://schemas.microsoft.com/office/powerpoint/2010/main" val="1816377059"/>
+      </p:ext>
+    </p:extLst>
+  </p:cSld>
+  <p:clrMapOvr>
+    <a:masterClrMapping/>
+  </p:clrMapOvr>
+</p:sld>
+</file>
+
+<file path=ppt/slides/slide5.xml><?xml version="1.0" encoding="utf-8"?>
+<p:sld xmlns:a="http://schemas.openxmlformats.org/drawingml/2006/main" xmlns:r="http://schemas.openxmlformats.org/officeDocument/2006/relationships" xmlns:p="http://schemas.openxmlformats.org/presentationml/2006/main">
+  <p:cSld>
+    <p:spTree>
+      <p:nvGrpSpPr>
+        <p:cNvPr id="1" name=""/>
+        <p:cNvGrpSpPr/>
+        <p:nvPr/>
+      </p:nvGrpSpPr>
+      <p:grpSpPr>
+        <a:xfrm>
+          <a:off x="0" y="0"/>
+          <a:ext cx="0" cy="0"/>
+          <a:chOff x="0" y="0"/>
+          <a:chExt cx="0" cy="0"/>
+        </a:xfrm>
+      </p:grpSpPr>
+      <p:sp>
+        <p:nvSpPr>
+          <p:cNvPr id="2" name="Title 1">
+            <a:extLst>
+              <a:ext uri="{FF2B5EF4-FFF2-40B4-BE49-F238E27FC236}">
+                <a16:creationId xmlns:a16="http://schemas.microsoft.com/office/drawing/2014/main" id="{73CAD90D-A18B-28F1-D306-DB70B4144EE7}"/>
+              </a:ext>
+            </a:extLst>
+          </p:cNvPr>
+          <p:cNvSpPr>
+            <a:spLocks noGrp="1"/>
+          </p:cNvSpPr>
+          <p:nvPr>
+            <p:ph type="title"/>
+          </p:nvPr>
+        </p:nvSpPr>
+        <p:spPr/>
+        <p:txBody>
+          <a:bodyPr/>
+          <a:lstStyle/>
+          <a:p>
+            <a:r>
+              <a:rPr lang="en-US" dirty="0"/>
+              <a:t>Data Cleaning</a:t>
+            </a:r>
+          </a:p>
+        </p:txBody>
+      </p:sp>
+      <p:sp>
+        <p:nvSpPr>
+          <p:cNvPr id="3" name="Content Placeholder 2">
+            <a:extLst>
+              <a:ext uri="{FF2B5EF4-FFF2-40B4-BE49-F238E27FC236}">
+                <a16:creationId xmlns:a16="http://schemas.microsoft.com/office/drawing/2014/main" id="{0CC3D51F-4ACB-1768-A52F-A2D703668CDE}"/>
+              </a:ext>
+            </a:extLst>
+          </p:cNvPr>
+          <p:cNvSpPr>
+            <a:spLocks noGrp="1"/>
+          </p:cNvSpPr>
+          <p:nvPr>
+            <p:ph idx="1"/>
+          </p:nvPr>
+        </p:nvSpPr>
+        <p:spPr/>
+        <p:txBody>
+          <a:bodyPr/>
+          <a:lstStyle/>
+          <a:p>
+            <a:endParaRPr lang="en-US"/>
+          </a:p>
+        </p:txBody>
+      </p:sp>
+    </p:spTree>
+    <p:extLst>
+      <p:ext uri="{BB962C8B-B14F-4D97-AF65-F5344CB8AC3E}">
+        <p14:creationId xmlns:p14="http://schemas.microsoft.com/office/powerpoint/2010/main" val="2085731179"/>
+      </p:ext>
+    </p:extLst>
+  </p:cSld>
+  <p:clrMapOvr>
+    <a:masterClrMapping/>
+  </p:clrMapOvr>
+</p:sld>
+</file>
+
+<file path=ppt/slides/slide6.xml><?xml version="1.0" encoding="utf-8"?>
+<p:sld xmlns:a="http://schemas.openxmlformats.org/drawingml/2006/main" xmlns:r="http://schemas.openxmlformats.org/officeDocument/2006/relationships" xmlns:p="http://schemas.openxmlformats.org/presentationml/2006/main">
+  <p:cSld>
+    <p:spTree>
+      <p:nvGrpSpPr>
+        <p:cNvPr id="1" name=""/>
+        <p:cNvGrpSpPr/>
+        <p:nvPr/>
+      </p:nvGrpSpPr>
+      <p:grpSpPr>
+        <a:xfrm>
+          <a:off x="0" y="0"/>
+          <a:ext cx="0" cy="0"/>
+          <a:chOff x="0" y="0"/>
+          <a:chExt cx="0" cy="0"/>
+        </a:xfrm>
+      </p:grpSpPr>
+      <p:sp>
+        <p:nvSpPr>
+          <p:cNvPr id="2" name="Title 1">
+            <a:extLst>
+              <a:ext uri="{FF2B5EF4-FFF2-40B4-BE49-F238E27FC236}">
+                <a16:creationId xmlns:a16="http://schemas.microsoft.com/office/drawing/2014/main" id="{533C5292-ED92-9CAC-0D78-53A6D50ABDAF}"/>
+              </a:ext>
+            </a:extLst>
+          </p:cNvPr>
+          <p:cNvSpPr>
+            <a:spLocks noGrp="1"/>
+          </p:cNvSpPr>
+          <p:nvPr>
+            <p:ph type="title"/>
+          </p:nvPr>
+        </p:nvSpPr>
+        <p:spPr/>
+        <p:txBody>
+          <a:bodyPr/>
+          <a:lstStyle/>
+          <a:p>
+            <a:r>
+              <a:rPr lang="en-US" dirty="0"/>
+              <a:t>Word cloud</a:t>
+            </a:r>
+          </a:p>
+        </p:txBody>
+      </p:sp>
+      <p:sp>
+        <p:nvSpPr>
+          <p:cNvPr id="3" name="Content Placeholder 2">
+            <a:extLst>
+              <a:ext uri="{FF2B5EF4-FFF2-40B4-BE49-F238E27FC236}">
+                <a16:creationId xmlns:a16="http://schemas.microsoft.com/office/drawing/2014/main" id="{28FAADB1-BB20-14AD-3D2D-DA482F635C79}"/>
+              </a:ext>
+            </a:extLst>
+          </p:cNvPr>
+          <p:cNvSpPr>
+            <a:spLocks noGrp="1"/>
+          </p:cNvSpPr>
+          <p:nvPr>
+            <p:ph idx="1"/>
+          </p:nvPr>
+        </p:nvSpPr>
+        <p:spPr/>
+        <p:txBody>
+          <a:bodyPr/>
+          <a:lstStyle/>
+          <a:p>
+            <a:endParaRPr lang="en-US"/>
+          </a:p>
+        </p:txBody>
+      </p:sp>
+      <p:pic>
+        <p:nvPicPr>
+          <p:cNvPr id="1026" name="Picture 2">
+            <a:extLst>
+              <a:ext uri="{FF2B5EF4-FFF2-40B4-BE49-F238E27FC236}">
+                <a16:creationId xmlns:a16="http://schemas.microsoft.com/office/drawing/2014/main" id="{CBDBF659-8593-F459-0D37-B18D0A3EA888}"/>
+              </a:ext>
+            </a:extLst>
+          </p:cNvPr>
+          <p:cNvPicPr>
+            <a:picLocks noChangeAspect="1" noChangeArrowheads="1"/>
+          </p:cNvPicPr>
+          <p:nvPr/>
+        </p:nvPicPr>
+        <p:blipFill>
+          <a:blip r:embed="rId2">
+            <a:extLst>
+              <a:ext uri="{28A0092B-C50C-407E-A947-70E740481C1C}">
+                <a14:useLocalDpi xmlns:a14="http://schemas.microsoft.com/office/drawing/2010/main" val="0"/>
+              </a:ext>
+            </a:extLst>
+          </a:blip>
+          <a:srcRect/>
+          <a:stretch>
+            <a:fillRect/>
+          </a:stretch>
+        </p:blipFill>
+        <p:spPr bwMode="auto">
+          <a:xfrm>
+            <a:off x="2058866" y="2437202"/>
+            <a:ext cx="5026267" cy="2606746"/>
+          </a:xfrm>
+          <a:prstGeom prst="rect">
+            <a:avLst/>
+          </a:prstGeom>
+          <a:noFill/>
+          <a:extLst>
+            <a:ext uri="{909E8E84-426E-40DD-AFC4-6F175D3DCCD1}">
+              <a14:hiddenFill xmlns:a14="http://schemas.microsoft.com/office/drawing/2010/main">
+                <a:solidFill>
+                  <a:srgbClr val="FFFFFF"/>
+                </a:solidFill>
+              </a14:hiddenFill>
+            </a:ext>
+          </a:extLst>
+        </p:spPr>
+      </p:pic>
+    </p:spTree>
+    <p:extLst>
+      <p:ext uri="{BB962C8B-B14F-4D97-AF65-F5344CB8AC3E}">
+        <p14:creationId xmlns:p14="http://schemas.microsoft.com/office/powerpoint/2010/main" val="2823871320"/>
+      </p:ext>
+    </p:extLst>
+  </p:cSld>
+  <p:clrMapOvr>
+    <a:masterClrMapping/>
+  </p:clrMapOvr>
+</p:sld>
+</file>
+
+<file path=ppt/slides/slide7.xml><?xml version="1.0" encoding="utf-8"?>
+<p:sld xmlns:a="http://schemas.openxmlformats.org/drawingml/2006/main" xmlns:r="http://schemas.openxmlformats.org/officeDocument/2006/relationships" xmlns:p="http://schemas.openxmlformats.org/presentationml/2006/main">
+  <p:cSld>
+    <p:spTree>
+      <p:nvGrpSpPr>
+        <p:cNvPr id="1" name=""/>
+        <p:cNvGrpSpPr/>
+        <p:nvPr/>
+      </p:nvGrpSpPr>
+      <p:grpSpPr>
+        <a:xfrm>
+          <a:off x="0" y="0"/>
+          <a:ext cx="0" cy="0"/>
+          <a:chOff x="0" y="0"/>
+          <a:chExt cx="0" cy="0"/>
+        </a:xfrm>
+      </p:grpSpPr>
+      <p:sp>
+        <p:nvSpPr>
+          <p:cNvPr id="2" name="Title 1">
+            <a:extLst>
+              <a:ext uri="{FF2B5EF4-FFF2-40B4-BE49-F238E27FC236}">
+                <a16:creationId xmlns:a16="http://schemas.microsoft.com/office/drawing/2014/main" id="{4EA34D63-F289-662E-A0F9-5A21AB5DC39D}"/>
+              </a:ext>
+            </a:extLst>
+          </p:cNvPr>
+          <p:cNvSpPr>
+            <a:spLocks noGrp="1"/>
+          </p:cNvSpPr>
+          <p:nvPr>
+            <p:ph type="title"/>
+          </p:nvPr>
+        </p:nvSpPr>
+        <p:spPr/>
+        <p:txBody>
+          <a:bodyPr/>
+          <a:lstStyle/>
+          <a:p>
+            <a:r>
+              <a:rPr lang="en-US" dirty="0"/>
+              <a:t>Sentiment Analysis</a:t>
+            </a:r>
+          </a:p>
+        </p:txBody>
+      </p:sp>
+      <p:sp>
+        <p:nvSpPr>
+          <p:cNvPr id="3" name="Content Placeholder 2">
+            <a:extLst>
+              <a:ext uri="{FF2B5EF4-FFF2-40B4-BE49-F238E27FC236}">
+                <a16:creationId xmlns:a16="http://schemas.microsoft.com/office/drawing/2014/main" id="{B217DA77-C01A-D63C-4B9F-BBDD11430BDA}"/>
+              </a:ext>
+            </a:extLst>
+          </p:cNvPr>
+          <p:cNvSpPr>
+            <a:spLocks noGrp="1"/>
+          </p:cNvSpPr>
+          <p:nvPr>
+            <p:ph idx="1"/>
+          </p:nvPr>
+        </p:nvSpPr>
+        <p:spPr/>
+        <p:txBody>
+          <a:bodyPr/>
+          <a:lstStyle/>
+          <a:p>
+            <a:endParaRPr lang="en-US"/>
+          </a:p>
+        </p:txBody>
+      </p:sp>
+    </p:spTree>
+    <p:extLst>
+      <p:ext uri="{BB962C8B-B14F-4D97-AF65-F5344CB8AC3E}">
+        <p14:creationId xmlns:p14="http://schemas.microsoft.com/office/powerpoint/2010/main" val="3634191141"/>
+      </p:ext>
+    </p:extLst>
+  </p:cSld>
+  <p:clrMapOvr>
+    <a:masterClrMapping/>
+  </p:clrMapOvr>
+</p:sld>
+</file>
+
+<file path=ppt/slides/slide8.xml><?xml version="1.0" encoding="utf-8"?>
+<p:sld xmlns:a="http://schemas.openxmlformats.org/drawingml/2006/main" xmlns:r="http://schemas.openxmlformats.org/officeDocument/2006/relationships" xmlns:p="http://schemas.openxmlformats.org/presentationml/2006/main">
+  <p:cSld>
+    <p:spTree>
+      <p:nvGrpSpPr>
+        <p:cNvPr id="1" name=""/>
+        <p:cNvGrpSpPr/>
+        <p:nvPr/>
+      </p:nvGrpSpPr>
+      <p:grpSpPr>
+        <a:xfrm>
+          <a:off x="0" y="0"/>
+          <a:ext cx="0" cy="0"/>
+          <a:chOff x="0" y="0"/>
+          <a:chExt cx="0" cy="0"/>
+        </a:xfrm>
+      </p:grpSpPr>
+      <p:sp>
+        <p:nvSpPr>
+          <p:cNvPr id="2" name="Title 1">
+            <a:extLst>
+              <a:ext uri="{FF2B5EF4-FFF2-40B4-BE49-F238E27FC236}">
+                <a16:creationId xmlns:a16="http://schemas.microsoft.com/office/drawing/2014/main" id="{4DA2F322-24EA-0860-72B1-D0F968F570C6}"/>
+              </a:ext>
+            </a:extLst>
+          </p:cNvPr>
+          <p:cNvSpPr>
+            <a:spLocks noGrp="1"/>
+          </p:cNvSpPr>
+          <p:nvPr>
+            <p:ph type="title"/>
+          </p:nvPr>
+        </p:nvSpPr>
+        <p:spPr/>
+        <p:txBody>
+          <a:bodyPr/>
+          <a:lstStyle/>
+          <a:p>
+            <a:r>
+              <a:rPr lang="en-US" dirty="0"/>
+              <a:t>Results</a:t>
+            </a:r>
+          </a:p>
+        </p:txBody>
+      </p:sp>
+      <p:pic>
+        <p:nvPicPr>
+          <p:cNvPr id="2050" name="Picture 2">
+            <a:extLst>
+              <a:ext uri="{FF2B5EF4-FFF2-40B4-BE49-F238E27FC236}">
+                <a16:creationId xmlns:a16="http://schemas.microsoft.com/office/drawing/2014/main" id="{16C4B04C-35EF-58D4-415D-E569D13B9E02}"/>
+              </a:ext>
+            </a:extLst>
+          </p:cNvPr>
+          <p:cNvPicPr>
+            <a:picLocks noGrp="1" noChangeAspect="1" noChangeArrowheads="1"/>
+          </p:cNvPicPr>
+          <p:nvPr>
+            <p:ph idx="1"/>
+          </p:nvPr>
+        </p:nvPicPr>
+        <p:blipFill>
+          <a:blip r:embed="rId2">
+            <a:extLst>
+              <a:ext uri="{28A0092B-C50C-407E-A947-70E740481C1C}">
+                <a14:useLocalDpi xmlns:a14="http://schemas.microsoft.com/office/drawing/2010/main" val="0"/>
+              </a:ext>
+            </a:extLst>
+          </a:blip>
+          <a:srcRect/>
+          <a:stretch>
+            <a:fillRect/>
+          </a:stretch>
+        </p:blipFill>
+        <p:spPr bwMode="auto">
+          <a:xfrm>
+            <a:off x="628650" y="2336697"/>
+            <a:ext cx="7886700" cy="3329194"/>
+          </a:xfrm>
+          <a:prstGeom prst="rect">
+            <a:avLst/>
+          </a:prstGeom>
+          <a:noFill/>
+          <a:extLst>
+            <a:ext uri="{909E8E84-426E-40DD-AFC4-6F175D3DCCD1}">
+              <a14:hiddenFill xmlns:a14="http://schemas.microsoft.com/office/drawing/2010/main">
+                <a:solidFill>
+                  <a:srgbClr val="FFFFFF"/>
+                </a:solidFill>
+              </a14:hiddenFill>
+            </a:ext>
+          </a:extLst>
+        </p:spPr>
+      </p:pic>
+    </p:spTree>
+    <p:extLst>
+      <p:ext uri="{BB962C8B-B14F-4D97-AF65-F5344CB8AC3E}">
+        <p14:creationId xmlns:p14="http://schemas.microsoft.com/office/powerpoint/2010/main" val="1174320655"/>
+      </p:ext>
+    </p:extLst>
+  </p:cSld>
+  <p:clrMapOvr>
+    <a:masterClrMapping/>
+  </p:clrMapOvr>
+</p:sld>
+</file>
+
+<file path=ppt/slides/slide9.xml><?xml version="1.0" encoding="utf-8"?>
+<p:sld xmlns:a="http://schemas.openxmlformats.org/drawingml/2006/main" xmlns:r="http://schemas.openxmlformats.org/officeDocument/2006/relationships" xmlns:p="http://schemas.openxmlformats.org/presentationml/2006/main">
+  <p:cSld>
+    <p:spTree>
+      <p:nvGrpSpPr>
+        <p:cNvPr id="1" name=""/>
+        <p:cNvGrpSpPr/>
+        <p:nvPr/>
+      </p:nvGrpSpPr>
+      <p:grpSpPr>
+        <a:xfrm>
+          <a:off x="0" y="0"/>
+          <a:ext cx="0" cy="0"/>
+          <a:chOff x="0" y="0"/>
+          <a:chExt cx="0" cy="0"/>
+        </a:xfrm>
+      </p:grpSpPr>
+      <p:pic>
+        <p:nvPicPr>
+          <p:cNvPr id="3074" name="Picture 2">
+            <a:extLst>
+              <a:ext uri="{FF2B5EF4-FFF2-40B4-BE49-F238E27FC236}">
+                <a16:creationId xmlns:a16="http://schemas.microsoft.com/office/drawing/2014/main" id="{1260EC94-159C-F1F0-06A2-C1A2A39966D5}"/>
+              </a:ext>
+            </a:extLst>
+          </p:cNvPr>
+          <p:cNvPicPr>
+            <a:picLocks noGrp="1" noChangeAspect="1" noChangeArrowheads="1"/>
+          </p:cNvPicPr>
+          <p:nvPr>
+            <p:ph idx="1"/>
+          </p:nvPr>
+        </p:nvPicPr>
+        <p:blipFill>
+          <a:blip r:embed="rId2">
+            <a:extLst>
+              <a:ext uri="{28A0092B-C50C-407E-A947-70E740481C1C}">
+                <a14:useLocalDpi xmlns:a14="http://schemas.microsoft.com/office/drawing/2010/main" val="0"/>
+              </a:ext>
+            </a:extLst>
+          </a:blip>
+          <a:srcRect/>
+          <a:stretch>
+            <a:fillRect/>
+          </a:stretch>
+        </p:blipFill>
+        <p:spPr bwMode="auto">
+          <a:xfrm>
+            <a:off x="628650" y="2336697"/>
+            <a:ext cx="7886700" cy="3329194"/>
+          </a:xfrm>
+          <a:prstGeom prst="rect">
+            <a:avLst/>
+          </a:prstGeom>
+          <a:noFill/>
+          <a:extLst>
+            <a:ext uri="{909E8E84-426E-40DD-AFC4-6F175D3DCCD1}">
+              <a14:hiddenFill xmlns:a14="http://schemas.microsoft.com/office/drawing/2010/main">
+                <a:solidFill>
+                  <a:srgbClr val="FFFFFF"/>
+                </a:solidFill>
+              </a14:hiddenFill>
+            </a:ext>
+          </a:extLst>
+        </p:spPr>
+      </p:pic>
+    </p:spTree>
+    <p:extLst>
+      <p:ext uri="{BB962C8B-B14F-4D97-AF65-F5344CB8AC3E}">
+        <p14:creationId xmlns:p14="http://schemas.microsoft.com/office/powerpoint/2010/main" val="1371256699"/>
       </p:ext>
     </p:extLst>
   </p:cSld>

</xml_diff>